<commit_message>
add criação de projeto
</commit_message>
<xml_diff>
--- a/Apresentação.pptx
+++ b/Apresentação.pptx
@@ -3452,7 +3452,7 @@
         </p:blipFill>
         <p:spPr>
           <a:xfrm>
-            <a:off x="3773105" y="-107780"/>
+            <a:off x="-193984" y="-119249"/>
             <a:ext cx="5784782" cy="7096497"/>
           </a:xfrm>
           <a:prstGeom prst="rect">
@@ -3463,7 +3463,7 @@
     </p:spTree>
     <p:extLst>
       <p:ext uri="{BB962C8B-B14F-4D97-AF65-F5344CB8AC3E}">
-        <p14:creationId xmlns:p14="http://schemas.microsoft.com/office/powerpoint/2010/main" val="1325310484"/>
+        <p14:creationId xmlns:p14="http://schemas.microsoft.com/office/powerpoint/2010/main" val="2804702237"/>
       </p:ext>
     </p:extLst>
   </p:cSld>
@@ -3790,7 +3790,7 @@
     </p:spTree>
     <p:extLst>
       <p:ext uri="{BB962C8B-B14F-4D97-AF65-F5344CB8AC3E}">
-        <p14:creationId xmlns:p14="http://schemas.microsoft.com/office/powerpoint/2010/main" val="605713581"/>
+        <p14:creationId xmlns:p14="http://schemas.microsoft.com/office/powerpoint/2010/main" val="1780143173"/>
       </p:ext>
     </p:extLst>
   </p:cSld>
@@ -4032,12 +4032,12 @@
           <a:lstStyle/>
           <a:p>
             <a:r>
-              <a:rPr lang="pt-BR" i="1" dirty="0">
+              <a:rPr lang="pt-BR" b="1" i="1" dirty="0">
                 <a:cs typeface="Calibri Light"/>
               </a:rPr>
               <a:t>Processo de instalação</a:t>
             </a:r>
-            <a:endParaRPr lang="pt-BR" i="1" dirty="0"/>
+            <a:endParaRPr lang="pt-BR" b="1" i="1" dirty="0"/>
           </a:p>
         </p:txBody>
       </p:sp>
@@ -4131,8 +4131,32 @@
         </p:blipFill>
         <p:spPr>
           <a:xfrm>
-            <a:off x="4473716" y="2543175"/>
+            <a:off x="536716" y="2530475"/>
             <a:ext cx="2857500" cy="3600450"/>
+          </a:xfrm>
+          <a:prstGeom prst="rect">
+            <a:avLst/>
+          </a:prstGeom>
+        </p:spPr>
+      </p:pic>
+      <p:pic>
+        <p:nvPicPr>
+          <p:cNvPr id="8" name="Imagem 7"/>
+          <p:cNvPicPr>
+            <a:picLocks noChangeAspect="1"/>
+          </p:cNvPicPr>
+          <p:nvPr/>
+        </p:nvPicPr>
+        <p:blipFill>
+          <a:blip r:embed="rId5"/>
+          <a:stretch>
+            <a:fillRect/>
+          </a:stretch>
+        </p:blipFill>
+        <p:spPr>
+          <a:xfrm>
+            <a:off x="4269985" y="2530475"/>
+            <a:ext cx="6754784" cy="909669"/>
           </a:xfrm>
           <a:prstGeom prst="rect">
             <a:avLst/>
@@ -4142,7 +4166,7 @@
     </p:spTree>
     <p:extLst>
       <p:ext uri="{BB962C8B-B14F-4D97-AF65-F5344CB8AC3E}">
-        <p14:creationId xmlns:p14="http://schemas.microsoft.com/office/powerpoint/2010/main" val="3082042051"/>
+        <p14:creationId xmlns:p14="http://schemas.microsoft.com/office/powerpoint/2010/main" val="4087239652"/>
       </p:ext>
     </p:extLst>
   </p:cSld>
@@ -4407,279 +4431,6 @@
       </p:grpSpPr>
       <p:pic>
         <p:nvPicPr>
-          <p:cNvPr id="6" name="background video white">
-            <a:hlinkClick r:id="" action="ppaction://media"/>
-          </p:cNvPr>
-          <p:cNvPicPr>
-            <a:picLocks noChangeAspect="1"/>
-          </p:cNvPicPr>
-          <p:nvPr/>
-        </p:nvPicPr>
-        <p:blipFill>
-          <a:blip r:embed="rId2"/>
-          <a:stretch>
-            <a:fillRect/>
-          </a:stretch>
-        </p:blipFill>
-        <p:spPr>
-          <a:xfrm>
-            <a:off x="0" y="-2"/>
-            <a:ext cx="12192000" cy="6858000"/>
-          </a:xfrm>
-          <a:prstGeom prst="rect">
-            <a:avLst/>
-          </a:prstGeom>
-        </p:spPr>
-      </p:pic>
-      <p:sp>
-        <p:nvSpPr>
-          <p:cNvPr id="2" name="Título 1">
-            <a:extLst>
-              <a:ext uri="{FF2B5EF4-FFF2-40B4-BE49-F238E27FC236}">
-                <a16:creationId xmlns:a16="http://schemas.microsoft.com/office/drawing/2014/main" id="{BAAA66C6-5B69-0509-5A47-9EEE34B9716E}"/>
-              </a:ext>
-            </a:extLst>
-          </p:cNvPr>
-          <p:cNvSpPr>
-            <a:spLocks noGrp="1"/>
-          </p:cNvSpPr>
-          <p:nvPr>
-            <p:ph type="title"/>
-          </p:nvPr>
-        </p:nvSpPr>
-        <p:spPr>
-          <a:xfrm>
-            <a:off x="0" y="0"/>
-            <a:ext cx="5301342" cy="1325563"/>
-          </a:xfrm>
-        </p:spPr>
-        <p:txBody>
-          <a:bodyPr/>
-          <a:lstStyle/>
-          <a:p>
-            <a:r>
-              <a:rPr lang="pt-BR" i="1" dirty="0">
-                <a:cs typeface="Calibri Light"/>
-              </a:rPr>
-              <a:t>Processo de instalação</a:t>
-            </a:r>
-            <a:endParaRPr lang="pt-BR" i="1" dirty="0"/>
-          </a:p>
-        </p:txBody>
-      </p:sp>
-      <p:pic>
-        <p:nvPicPr>
-          <p:cNvPr id="7" name="Espaço Reservado para Conteúdo 11"/>
-          <p:cNvPicPr>
-            <a:picLocks noChangeAspect="1"/>
-          </p:cNvPicPr>
-          <p:nvPr/>
-        </p:nvPicPr>
-        <p:blipFill>
-          <a:blip r:embed="rId3" cstate="print">
-            <a:extLst>
-              <a:ext uri="{28A0092B-C50C-407E-A947-70E740481C1C}">
-                <a14:useLocalDpi xmlns:a14="http://schemas.microsoft.com/office/drawing/2010/main" val="0"/>
-              </a:ext>
-            </a:extLst>
-          </a:blip>
-          <a:stretch>
-            <a:fillRect/>
-          </a:stretch>
-        </p:blipFill>
-        <p:spPr>
-          <a:xfrm>
-            <a:off x="11024769" y="5633867"/>
-            <a:ext cx="1167231" cy="1485567"/>
-          </a:xfrm>
-          <a:prstGeom prst="rect">
-            <a:avLst/>
-          </a:prstGeom>
-        </p:spPr>
-      </p:pic>
-      <p:pic>
-        <p:nvPicPr>
-          <p:cNvPr id="4" name="Imagem 3"/>
-          <p:cNvPicPr>
-            <a:picLocks noChangeAspect="1"/>
-          </p:cNvPicPr>
-          <p:nvPr/>
-        </p:nvPicPr>
-        <p:blipFill>
-          <a:blip r:embed="rId4"/>
-          <a:stretch>
-            <a:fillRect/>
-          </a:stretch>
-        </p:blipFill>
-        <p:spPr>
-          <a:xfrm>
-            <a:off x="2356473" y="1325563"/>
-            <a:ext cx="6687483" cy="5068007"/>
-          </a:xfrm>
-          <a:prstGeom prst="rect">
-            <a:avLst/>
-          </a:prstGeom>
-        </p:spPr>
-      </p:pic>
-    </p:spTree>
-    <p:extLst>
-      <p:ext uri="{BB962C8B-B14F-4D97-AF65-F5344CB8AC3E}">
-        <p14:creationId xmlns:p14="http://schemas.microsoft.com/office/powerpoint/2010/main" val="3045026795"/>
-      </p:ext>
-    </p:extLst>
-  </p:cSld>
-  <p:clrMapOvr>
-    <a:masterClrMapping/>
-  </p:clrMapOvr>
-  <p:timing>
-    <p:tnLst>
-      <p:par>
-        <p:cTn id="1" dur="indefinite" restart="never" nodeType="tmRoot">
-          <p:childTnLst>
-            <p:seq concurrent="1" nextAc="seek">
-              <p:cTn id="2" dur="indefinite" nodeType="mainSeq">
-                <p:childTnLst>
-                  <p:par>
-                    <p:cTn id="3" fill="hold">
-                      <p:stCondLst>
-                        <p:cond delay="indefinite"/>
-                        <p:cond evt="onBegin" delay="0">
-                          <p:tn val="2"/>
-                        </p:cond>
-                      </p:stCondLst>
-                      <p:childTnLst>
-                        <p:par>
-                          <p:cTn id="4" fill="hold">
-                            <p:stCondLst>
-                              <p:cond delay="0"/>
-                            </p:stCondLst>
-                            <p:childTnLst>
-                              <p:par>
-                                <p:cTn id="5" presetID="2" presetClass="entr" presetSubtype="8" decel="100000" fill="hold" grpId="0" nodeType="withEffect">
-                                  <p:stCondLst>
-                                    <p:cond delay="0"/>
-                                  </p:stCondLst>
-                                  <p:childTnLst>
-                                    <p:set>
-                                      <p:cBhvr>
-                                        <p:cTn id="6" dur="1" fill="hold">
-                                          <p:stCondLst>
-                                            <p:cond delay="0"/>
-                                          </p:stCondLst>
-                                        </p:cTn>
-                                        <p:tgtEl>
-                                          <p:spTgt spid="2"/>
-                                        </p:tgtEl>
-                                        <p:attrNameLst>
-                                          <p:attrName>style.visibility</p:attrName>
-                                        </p:attrNameLst>
-                                      </p:cBhvr>
-                                      <p:to>
-                                        <p:strVal val="visible"/>
-                                      </p:to>
-                                    </p:set>
-                                    <p:anim calcmode="lin" valueType="num">
-                                      <p:cBhvr additive="base">
-                                        <p:cTn id="7" dur="500" fill="hold"/>
-                                        <p:tgtEl>
-                                          <p:spTgt spid="2"/>
-                                        </p:tgtEl>
-                                        <p:attrNameLst>
-                                          <p:attrName>ppt_x</p:attrName>
-                                        </p:attrNameLst>
-                                      </p:cBhvr>
-                                      <p:tavLst>
-                                        <p:tav tm="0">
-                                          <p:val>
-                                            <p:strVal val="0-#ppt_w/2"/>
-                                          </p:val>
-                                        </p:tav>
-                                        <p:tav tm="100000">
-                                          <p:val>
-                                            <p:strVal val="#ppt_x"/>
-                                          </p:val>
-                                        </p:tav>
-                                      </p:tavLst>
-                                    </p:anim>
-                                    <p:anim calcmode="lin" valueType="num">
-                                      <p:cBhvr additive="base">
-                                        <p:cTn id="8" dur="500" fill="hold"/>
-                                        <p:tgtEl>
-                                          <p:spTgt spid="2"/>
-                                        </p:tgtEl>
-                                        <p:attrNameLst>
-                                          <p:attrName>ppt_y</p:attrName>
-                                        </p:attrNameLst>
-                                      </p:cBhvr>
-                                      <p:tavLst>
-                                        <p:tav tm="0">
-                                          <p:val>
-                                            <p:strVal val="#ppt_y"/>
-                                          </p:val>
-                                        </p:tav>
-                                        <p:tav tm="100000">
-                                          <p:val>
-                                            <p:strVal val="#ppt_y"/>
-                                          </p:val>
-                                        </p:tav>
-                                      </p:tavLst>
-                                    </p:anim>
-                                  </p:childTnLst>
-                                </p:cTn>
-                              </p:par>
-                            </p:childTnLst>
-                          </p:cTn>
-                        </p:par>
-                      </p:childTnLst>
-                    </p:cTn>
-                  </p:par>
-                </p:childTnLst>
-              </p:cTn>
-              <p:prevCondLst>
-                <p:cond evt="onPrev" delay="0">
-                  <p:tgtEl>
-                    <p:sldTgt/>
-                  </p:tgtEl>
-                </p:cond>
-              </p:prevCondLst>
-              <p:nextCondLst>
-                <p:cond evt="onNext" delay="0">
-                  <p:tgtEl>
-                    <p:sldTgt/>
-                  </p:tgtEl>
-                </p:cond>
-              </p:nextCondLst>
-            </p:seq>
-          </p:childTnLst>
-        </p:cTn>
-      </p:par>
-    </p:tnLst>
-    <p:bldLst>
-      <p:bldP spid="2" grpId="0"/>
-    </p:bldLst>
-  </p:timing>
-</p:sld>
-</file>
-
-<file path=ppt/slides/slide5.xml><?xml version="1.0" encoding="utf-8"?>
-<p:sld xmlns:a="http://schemas.openxmlformats.org/drawingml/2006/main" xmlns:r="http://schemas.openxmlformats.org/officeDocument/2006/relationships" xmlns:p="http://schemas.openxmlformats.org/presentationml/2006/main">
-  <p:cSld>
-    <p:spTree>
-      <p:nvGrpSpPr>
-        <p:cNvPr id="1" name=""/>
-        <p:cNvGrpSpPr/>
-        <p:nvPr/>
-      </p:nvGrpSpPr>
-      <p:grpSpPr>
-        <a:xfrm>
-          <a:off x="0" y="0"/>
-          <a:ext cx="0" cy="0"/>
-          <a:chOff x="0" y="0"/>
-          <a:chExt cx="0" cy="0"/>
-        </a:xfrm>
-      </p:grpSpPr>
-      <p:pic>
-        <p:nvPicPr>
           <p:cNvPr id="4" name="background video white">
             <a:hlinkClick r:id="" action="ppaction://media"/>
           </p:cNvPr>
@@ -4713,7 +4464,7 @@
         <p:spPr>
           <a:xfrm>
             <a:off x="0" y="0"/>
-            <a:ext cx="4637167" cy="769441"/>
+            <a:ext cx="4733347" cy="769441"/>
           </a:xfrm>
           <a:prstGeom prst="rect">
             <a:avLst/>
@@ -4726,12 +4477,12 @@
           <a:lstStyle/>
           <a:p>
             <a:r>
-              <a:rPr lang="pt-BR" sz="4400" i="1" dirty="0" smtClean="0">
+              <a:rPr lang="pt-BR" sz="4400" b="1" i="1" dirty="0" smtClean="0">
                 <a:cs typeface="Calibri Light"/>
               </a:rPr>
               <a:t>Integração com IDE</a:t>
             </a:r>
-            <a:endParaRPr lang="pt-BR" sz="4400" dirty="0"/>
+            <a:endParaRPr lang="pt-BR" sz="4400" b="1" dirty="0"/>
           </a:p>
         </p:txBody>
       </p:sp>
@@ -4844,7 +4595,7 @@
     </p:spTree>
     <p:extLst>
       <p:ext uri="{BB962C8B-B14F-4D97-AF65-F5344CB8AC3E}">
-        <p14:creationId xmlns:p14="http://schemas.microsoft.com/office/powerpoint/2010/main" val="1969692946"/>
+        <p14:creationId xmlns:p14="http://schemas.microsoft.com/office/powerpoint/2010/main" val="3712353627"/>
       </p:ext>
     </p:extLst>
   </p:cSld>
@@ -5051,6 +4802,302 @@
 </p:sld>
 </file>
 
+<file path=ppt/slides/slide5.xml><?xml version="1.0" encoding="utf-8"?>
+<p:sld xmlns:a="http://schemas.openxmlformats.org/drawingml/2006/main" xmlns:r="http://schemas.openxmlformats.org/officeDocument/2006/relationships" xmlns:p="http://schemas.openxmlformats.org/presentationml/2006/main">
+  <p:cSld>
+    <p:spTree>
+      <p:nvGrpSpPr>
+        <p:cNvPr id="1" name=""/>
+        <p:cNvGrpSpPr/>
+        <p:nvPr/>
+      </p:nvGrpSpPr>
+      <p:grpSpPr>
+        <a:xfrm>
+          <a:off x="0" y="0"/>
+          <a:ext cx="0" cy="0"/>
+          <a:chOff x="0" y="0"/>
+          <a:chExt cx="0" cy="0"/>
+        </a:xfrm>
+      </p:grpSpPr>
+      <p:pic>
+        <p:nvPicPr>
+          <p:cNvPr id="4" name="background video white">
+            <a:hlinkClick r:id="" action="ppaction://media"/>
+          </p:cNvPr>
+          <p:cNvPicPr>
+            <a:picLocks noChangeAspect="1"/>
+          </p:cNvPicPr>
+          <p:nvPr/>
+        </p:nvPicPr>
+        <p:blipFill>
+          <a:blip r:embed="rId2"/>
+          <a:stretch>
+            <a:fillRect/>
+          </a:stretch>
+        </p:blipFill>
+        <p:spPr>
+          <a:xfrm>
+            <a:off x="0" y="0"/>
+            <a:ext cx="12192000" cy="6858000"/>
+          </a:xfrm>
+          <a:prstGeom prst="rect">
+            <a:avLst/>
+          </a:prstGeom>
+        </p:spPr>
+      </p:pic>
+      <p:pic>
+        <p:nvPicPr>
+          <p:cNvPr id="5" name="Espaço Reservado para Conteúdo 11"/>
+          <p:cNvPicPr>
+            <a:picLocks noChangeAspect="1"/>
+          </p:cNvPicPr>
+          <p:nvPr/>
+        </p:nvPicPr>
+        <p:blipFill>
+          <a:blip r:embed="rId3" cstate="print">
+            <a:extLst>
+              <a:ext uri="{28A0092B-C50C-407E-A947-70E740481C1C}">
+                <a14:useLocalDpi xmlns:a14="http://schemas.microsoft.com/office/drawing/2010/main" val="0"/>
+              </a:ext>
+            </a:extLst>
+          </a:blip>
+          <a:stretch>
+            <a:fillRect/>
+          </a:stretch>
+        </p:blipFill>
+        <p:spPr>
+          <a:xfrm>
+            <a:off x="11024769" y="5633867"/>
+            <a:ext cx="1167231" cy="1485567"/>
+          </a:xfrm>
+          <a:prstGeom prst="rect">
+            <a:avLst/>
+          </a:prstGeom>
+        </p:spPr>
+      </p:pic>
+      <p:pic>
+        <p:nvPicPr>
+          <p:cNvPr id="6" name="Imagem 5"/>
+          <p:cNvPicPr>
+            <a:picLocks noChangeAspect="1"/>
+          </p:cNvPicPr>
+          <p:nvPr/>
+        </p:nvPicPr>
+        <p:blipFill>
+          <a:blip r:embed="rId4"/>
+          <a:stretch>
+            <a:fillRect/>
+          </a:stretch>
+        </p:blipFill>
+        <p:spPr>
+          <a:xfrm>
+            <a:off x="2548685" y="1325563"/>
+            <a:ext cx="6827327" cy="5173986"/>
+          </a:xfrm>
+          <a:prstGeom prst="rect">
+            <a:avLst/>
+          </a:prstGeom>
+        </p:spPr>
+      </p:pic>
+      <p:sp>
+        <p:nvSpPr>
+          <p:cNvPr id="7" name="Título 1">
+            <a:extLst>
+              <a:ext uri="{FF2B5EF4-FFF2-40B4-BE49-F238E27FC236}">
+                <a16:creationId xmlns:a16="http://schemas.microsoft.com/office/drawing/2014/main" id="{BAAA66C6-5B69-0509-5A47-9EEE34B9716E}"/>
+              </a:ext>
+            </a:extLst>
+          </p:cNvPr>
+          <p:cNvSpPr txBox="1">
+            <a:spLocks/>
+          </p:cNvSpPr>
+          <p:nvPr/>
+        </p:nvSpPr>
+        <p:spPr>
+          <a:xfrm>
+            <a:off x="0" y="0"/>
+            <a:ext cx="7073900" cy="1325563"/>
+          </a:xfrm>
+          <a:prstGeom prst="rect">
+            <a:avLst/>
+          </a:prstGeom>
+        </p:spPr>
+        <p:txBody>
+          <a:bodyPr vert="horz" lIns="91440" tIns="45720" rIns="91440" bIns="45720" rtlCol="0" anchor="ctr">
+            <a:normAutofit/>
+          </a:bodyPr>
+          <a:lstStyle>
+            <a:lvl1pPr algn="l" defTabSz="914400" rtl="0" eaLnBrk="1" latinLnBrk="0" hangingPunct="1">
+              <a:lnSpc>
+                <a:spcPct val="90000"/>
+              </a:lnSpc>
+              <a:spcBef>
+                <a:spcPct val="0"/>
+              </a:spcBef>
+              <a:buNone/>
+              <a:defRPr sz="4400" kern="1200">
+                <a:solidFill>
+                  <a:schemeClr val="tx1"/>
+                </a:solidFill>
+                <a:latin typeface="+mj-lt"/>
+                <a:ea typeface="+mj-ea"/>
+                <a:cs typeface="+mj-cs"/>
+              </a:defRPr>
+            </a:lvl1pPr>
+          </a:lstStyle>
+          <a:p>
+            <a:r>
+              <a:rPr lang="pt-BR" b="1" i="1" dirty="0"/>
+              <a:t>Criação de um </a:t>
+            </a:r>
+            <a:r>
+              <a:rPr lang="pt-BR" b="1" i="1" dirty="0" smtClean="0"/>
+              <a:t>projeto exemplo</a:t>
+            </a:r>
+            <a:endParaRPr lang="pt-BR" b="1" i="1" dirty="0"/>
+          </a:p>
+        </p:txBody>
+      </p:sp>
+    </p:spTree>
+    <p:extLst>
+      <p:ext uri="{BB962C8B-B14F-4D97-AF65-F5344CB8AC3E}">
+        <p14:creationId xmlns:p14="http://schemas.microsoft.com/office/powerpoint/2010/main" val="3120323176"/>
+      </p:ext>
+    </p:extLst>
+  </p:cSld>
+  <p:clrMapOvr>
+    <a:masterClrMapping/>
+  </p:clrMapOvr>
+  <p:timing>
+    <p:tnLst>
+      <p:par>
+        <p:cTn id="1" dur="indefinite" restart="never" nodeType="tmRoot">
+          <p:childTnLst>
+            <p:seq concurrent="1" nextAc="seek">
+              <p:cTn id="2" dur="indefinite" nodeType="mainSeq">
+                <p:childTnLst>
+                  <p:par>
+                    <p:cTn id="3" fill="hold">
+                      <p:stCondLst>
+                        <p:cond delay="indefinite"/>
+                        <p:cond evt="onBegin" delay="0">
+                          <p:tn val="2"/>
+                        </p:cond>
+                      </p:stCondLst>
+                      <p:childTnLst>
+                        <p:par>
+                          <p:cTn id="4" fill="hold">
+                            <p:stCondLst>
+                              <p:cond delay="0"/>
+                            </p:stCondLst>
+                            <p:childTnLst>
+                              <p:par>
+                                <p:cTn id="5" presetID="2" presetClass="entr" presetSubtype="8" decel="100000" fill="hold" grpId="0" nodeType="withEffect">
+                                  <p:stCondLst>
+                                    <p:cond delay="0"/>
+                                  </p:stCondLst>
+                                  <p:childTnLst>
+                                    <p:set>
+                                      <p:cBhvr>
+                                        <p:cTn id="6" dur="1" fill="hold">
+                                          <p:stCondLst>
+                                            <p:cond delay="0"/>
+                                          </p:stCondLst>
+                                        </p:cTn>
+                                        <p:tgtEl>
+                                          <p:spTgt spid="7"/>
+                                        </p:tgtEl>
+                                        <p:attrNameLst>
+                                          <p:attrName>style.visibility</p:attrName>
+                                        </p:attrNameLst>
+                                      </p:cBhvr>
+                                      <p:to>
+                                        <p:strVal val="visible"/>
+                                      </p:to>
+                                    </p:set>
+                                    <p:anim calcmode="lin" valueType="num">
+                                      <p:cBhvr additive="base">
+                                        <p:cTn id="7" dur="500" fill="hold"/>
+                                        <p:tgtEl>
+                                          <p:spTgt spid="7"/>
+                                        </p:tgtEl>
+                                        <p:attrNameLst>
+                                          <p:attrName>ppt_x</p:attrName>
+                                        </p:attrNameLst>
+                                      </p:cBhvr>
+                                      <p:tavLst>
+                                        <p:tav tm="0">
+                                          <p:val>
+                                            <p:strVal val="0-#ppt_w/2"/>
+                                          </p:val>
+                                        </p:tav>
+                                        <p:tav tm="100000">
+                                          <p:val>
+                                            <p:strVal val="#ppt_x"/>
+                                          </p:val>
+                                        </p:tav>
+                                      </p:tavLst>
+                                    </p:anim>
+                                    <p:anim calcmode="lin" valueType="num">
+                                      <p:cBhvr additive="base">
+                                        <p:cTn id="8" dur="500" fill="hold"/>
+                                        <p:tgtEl>
+                                          <p:spTgt spid="7"/>
+                                        </p:tgtEl>
+                                        <p:attrNameLst>
+                                          <p:attrName>ppt_y</p:attrName>
+                                        </p:attrNameLst>
+                                      </p:cBhvr>
+                                      <p:tavLst>
+                                        <p:tav tm="0">
+                                          <p:val>
+                                            <p:strVal val="#ppt_y"/>
+                                          </p:val>
+                                        </p:tav>
+                                        <p:tav tm="100000">
+                                          <p:val>
+                                            <p:strVal val="#ppt_y"/>
+                                          </p:val>
+                                        </p:tav>
+                                      </p:tavLst>
+                                    </p:anim>
+                                  </p:childTnLst>
+                                </p:cTn>
+                              </p:par>
+                            </p:childTnLst>
+                          </p:cTn>
+                        </p:par>
+                      </p:childTnLst>
+                    </p:cTn>
+                  </p:par>
+                </p:childTnLst>
+              </p:cTn>
+              <p:prevCondLst>
+                <p:cond evt="onPrev" delay="0">
+                  <p:tgtEl>
+                    <p:sldTgt/>
+                  </p:tgtEl>
+                </p:cond>
+              </p:prevCondLst>
+              <p:nextCondLst>
+                <p:cond evt="onNext" delay="0">
+                  <p:tgtEl>
+                    <p:sldTgt/>
+                  </p:tgtEl>
+                </p:cond>
+              </p:nextCondLst>
+            </p:seq>
+          </p:childTnLst>
+        </p:cTn>
+      </p:par>
+    </p:tnLst>
+    <p:bldLst>
+      <p:bldP spid="7" grpId="0"/>
+    </p:bldLst>
+  </p:timing>
+</p:sld>
+</file>
+
 <file path=ppt/slides/slide6.xml><?xml version="1.0" encoding="utf-8"?>
 <p:sld xmlns:a="http://schemas.openxmlformats.org/drawingml/2006/main" xmlns:r="http://schemas.openxmlformats.org/officeDocument/2006/relationships" xmlns:p="http://schemas.openxmlformats.org/presentationml/2006/main">
   <p:cSld>
@@ -5094,36 +5141,6 @@
           </a:prstGeom>
         </p:spPr>
       </p:pic>
-      <p:sp>
-        <p:nvSpPr>
-          <p:cNvPr id="2" name="Título 1"/>
-          <p:cNvSpPr>
-            <a:spLocks noGrp="1"/>
-          </p:cNvSpPr>
-          <p:nvPr>
-            <p:ph type="title"/>
-          </p:nvPr>
-        </p:nvSpPr>
-        <p:spPr>
-          <a:xfrm>
-            <a:off x="3505200" y="2766218"/>
-            <a:ext cx="5760098" cy="1325563"/>
-          </a:xfrm>
-        </p:spPr>
-        <p:txBody>
-          <a:bodyPr>
-            <a:noAutofit/>
-          </a:bodyPr>
-          <a:lstStyle/>
-          <a:p>
-            <a:r>
-              <a:rPr lang="pt-BR" sz="4800" b="1" i="1" dirty="0" smtClean="0"/>
-              <a:t>Criação de um projeto</a:t>
-            </a:r>
-            <a:endParaRPr lang="pt-BR" sz="4800" b="1" i="1" dirty="0"/>
-          </a:p>
-        </p:txBody>
-      </p:sp>
       <p:pic>
         <p:nvPicPr>
           <p:cNvPr id="5" name="Espaço Reservado para Conteúdo 11"/>
@@ -5154,10 +5171,117 @@
           </a:prstGeom>
         </p:spPr>
       </p:pic>
+      <p:sp>
+        <p:nvSpPr>
+          <p:cNvPr id="7" name="Título 1">
+            <a:extLst>
+              <a:ext uri="{FF2B5EF4-FFF2-40B4-BE49-F238E27FC236}">
+                <a16:creationId xmlns:a16="http://schemas.microsoft.com/office/drawing/2014/main" id="{BAAA66C6-5B69-0509-5A47-9EEE34B9716E}"/>
+              </a:ext>
+            </a:extLst>
+          </p:cNvPr>
+          <p:cNvSpPr txBox="1">
+            <a:spLocks/>
+          </p:cNvSpPr>
+          <p:nvPr/>
+        </p:nvSpPr>
+        <p:spPr>
+          <a:xfrm>
+            <a:off x="0" y="0"/>
+            <a:ext cx="7073900" cy="1325563"/>
+          </a:xfrm>
+          <a:prstGeom prst="rect">
+            <a:avLst/>
+          </a:prstGeom>
+        </p:spPr>
+        <p:txBody>
+          <a:bodyPr vert="horz" lIns="91440" tIns="45720" rIns="91440" bIns="45720" rtlCol="0" anchor="ctr">
+            <a:normAutofit/>
+          </a:bodyPr>
+          <a:lstStyle>
+            <a:lvl1pPr algn="l" defTabSz="914400" rtl="0" eaLnBrk="1" latinLnBrk="0" hangingPunct="1">
+              <a:lnSpc>
+                <a:spcPct val="90000"/>
+              </a:lnSpc>
+              <a:spcBef>
+                <a:spcPct val="0"/>
+              </a:spcBef>
+              <a:buNone/>
+              <a:defRPr sz="4400" kern="1200">
+                <a:solidFill>
+                  <a:schemeClr val="tx1"/>
+                </a:solidFill>
+                <a:latin typeface="+mj-lt"/>
+                <a:ea typeface="+mj-ea"/>
+                <a:cs typeface="+mj-cs"/>
+              </a:defRPr>
+            </a:lvl1pPr>
+          </a:lstStyle>
+          <a:p>
+            <a:r>
+              <a:rPr lang="pt-BR" b="1" i="1" dirty="0"/>
+              <a:t>Criação de um </a:t>
+            </a:r>
+            <a:r>
+              <a:rPr lang="pt-BR" b="1" i="1" dirty="0" smtClean="0"/>
+              <a:t>projeto exemplo</a:t>
+            </a:r>
+            <a:endParaRPr lang="pt-BR" b="1" i="1" dirty="0"/>
+          </a:p>
+        </p:txBody>
+      </p:sp>
+      <p:pic>
+        <p:nvPicPr>
+          <p:cNvPr id="8" name="Imagem 7"/>
+          <p:cNvPicPr>
+            <a:picLocks noChangeAspect="1"/>
+          </p:cNvPicPr>
+          <p:nvPr/>
+        </p:nvPicPr>
+        <p:blipFill>
+          <a:blip r:embed="rId4"/>
+          <a:stretch>
+            <a:fillRect/>
+          </a:stretch>
+        </p:blipFill>
+        <p:spPr>
+          <a:xfrm>
+            <a:off x="1255498" y="1604962"/>
+            <a:ext cx="8175429" cy="1620837"/>
+          </a:xfrm>
+          <a:prstGeom prst="rect">
+            <a:avLst/>
+          </a:prstGeom>
+        </p:spPr>
+      </p:pic>
+      <p:pic>
+        <p:nvPicPr>
+          <p:cNvPr id="9" name="Imagem 8"/>
+          <p:cNvPicPr>
+            <a:picLocks noChangeAspect="1"/>
+          </p:cNvPicPr>
+          <p:nvPr/>
+        </p:nvPicPr>
+        <p:blipFill>
+          <a:blip r:embed="rId5"/>
+          <a:stretch>
+            <a:fillRect/>
+          </a:stretch>
+        </p:blipFill>
+        <p:spPr>
+          <a:xfrm>
+            <a:off x="1255498" y="4068336"/>
+            <a:ext cx="8175429" cy="1744347"/>
+          </a:xfrm>
+          <a:prstGeom prst="rect">
+            <a:avLst/>
+          </a:prstGeom>
+        </p:spPr>
+      </p:pic>
     </p:spTree>
     <p:extLst>
       <p:ext uri="{BB962C8B-B14F-4D97-AF65-F5344CB8AC3E}">
-        <p14:creationId xmlns:p14="http://schemas.microsoft.com/office/powerpoint/2010/main" val="3930675199"/>
+        <p14:creationId xmlns:p14="http://schemas.microsoft.com/office/powerpoint/2010/main" val="138984809"/>
       </p:ext>
     </p:extLst>
   </p:cSld>
@@ -5167,9 +5291,129 @@
   <p:timing>
     <p:tnLst>
       <p:par>
-        <p:cTn id="1" dur="indefinite" restart="never" nodeType="tmRoot"/>
+        <p:cTn id="1" dur="indefinite" restart="never" nodeType="tmRoot">
+          <p:childTnLst>
+            <p:seq concurrent="1" nextAc="seek">
+              <p:cTn id="2" dur="indefinite" nodeType="mainSeq">
+                <p:childTnLst>
+                  <p:par>
+                    <p:cTn id="3" fill="hold">
+                      <p:stCondLst>
+                        <p:cond delay="indefinite"/>
+                        <p:cond evt="onBegin" delay="0">
+                          <p:tn val="2"/>
+                        </p:cond>
+                      </p:stCondLst>
+                      <p:childTnLst>
+                        <p:par>
+                          <p:cTn id="4" fill="hold">
+                            <p:stCondLst>
+                              <p:cond delay="0"/>
+                            </p:stCondLst>
+                            <p:childTnLst>
+                              <p:par>
+                                <p:cTn id="5" presetID="2" presetClass="entr" presetSubtype="8" decel="100000" fill="hold" grpId="0" nodeType="withEffect">
+                                  <p:stCondLst>
+                                    <p:cond delay="0"/>
+                                  </p:stCondLst>
+                                  <p:childTnLst>
+                                    <p:set>
+                                      <p:cBhvr>
+                                        <p:cTn id="6" dur="1" fill="hold">
+                                          <p:stCondLst>
+                                            <p:cond delay="0"/>
+                                          </p:stCondLst>
+                                        </p:cTn>
+                                        <p:tgtEl>
+                                          <p:spTgt spid="7"/>
+                                        </p:tgtEl>
+                                        <p:attrNameLst>
+                                          <p:attrName>style.visibility</p:attrName>
+                                        </p:attrNameLst>
+                                      </p:cBhvr>
+                                      <p:to>
+                                        <p:strVal val="visible"/>
+                                      </p:to>
+                                    </p:set>
+                                    <p:anim calcmode="lin" valueType="num">
+                                      <p:cBhvr additive="base">
+                                        <p:cTn id="7" dur="500" fill="hold"/>
+                                        <p:tgtEl>
+                                          <p:spTgt spid="7"/>
+                                        </p:tgtEl>
+                                        <p:attrNameLst>
+                                          <p:attrName>ppt_x</p:attrName>
+                                        </p:attrNameLst>
+                                      </p:cBhvr>
+                                      <p:tavLst>
+                                        <p:tav tm="0">
+                                          <p:val>
+                                            <p:strVal val="0-#ppt_w/2"/>
+                                          </p:val>
+                                        </p:tav>
+                                        <p:tav tm="100000">
+                                          <p:val>
+                                            <p:strVal val="#ppt_x"/>
+                                          </p:val>
+                                        </p:tav>
+                                      </p:tavLst>
+                                    </p:anim>
+                                    <p:anim calcmode="lin" valueType="num">
+                                      <p:cBhvr additive="base">
+                                        <p:cTn id="8" dur="500" fill="hold"/>
+                                        <p:tgtEl>
+                                          <p:spTgt spid="7"/>
+                                        </p:tgtEl>
+                                        <p:attrNameLst>
+                                          <p:attrName>ppt_y</p:attrName>
+                                        </p:attrNameLst>
+                                      </p:cBhvr>
+                                      <p:tavLst>
+                                        <p:tav tm="0">
+                                          <p:val>
+                                            <p:strVal val="#ppt_y"/>
+                                          </p:val>
+                                        </p:tav>
+                                        <p:tav tm="100000">
+                                          <p:val>
+                                            <p:strVal val="#ppt_y"/>
+                                          </p:val>
+                                        </p:tav>
+                                      </p:tavLst>
+                                    </p:anim>
+                                  </p:childTnLst>
+                                </p:cTn>
+                              </p:par>
+                            </p:childTnLst>
+                          </p:cTn>
+                        </p:par>
+                      </p:childTnLst>
+                    </p:cTn>
+                  </p:par>
+                </p:childTnLst>
+              </p:cTn>
+              <p:prevCondLst>
+                <p:cond evt="onPrev" delay="0">
+                  <p:tgtEl>
+                    <p:sldTgt/>
+                  </p:tgtEl>
+                </p:cond>
+              </p:prevCondLst>
+              <p:nextCondLst>
+                <p:cond evt="onNext" delay="0">
+                  <p:tgtEl>
+                    <p:sldTgt/>
+                  </p:tgtEl>
+                </p:cond>
+              </p:nextCondLst>
+            </p:seq>
+          </p:childTnLst>
+        </p:cTn>
       </p:par>
     </p:tnLst>
+    <p:bldLst>
+      <p:bldP spid="7" grpId="0"/>
+    </p:bldLst>
   </p:timing>
 </p:sld>
 </file>
@@ -5281,7 +5525,7 @@
     </p:spTree>
     <p:extLst>
       <p:ext uri="{BB962C8B-B14F-4D97-AF65-F5344CB8AC3E}">
-        <p14:creationId xmlns:p14="http://schemas.microsoft.com/office/powerpoint/2010/main" val="2519717746"/>
+        <p14:creationId xmlns:p14="http://schemas.microsoft.com/office/powerpoint/2010/main" val="1676281519"/>
       </p:ext>
     </p:extLst>
   </p:cSld>

</xml_diff>